<commit_message>
remove additional 17 activity
</commit_message>
<xml_diff>
--- a/ClassMaterials/CallCC1/27-29-callcc-intro.pptx
+++ b/ClassMaterials/CallCC1/27-29-callcc-intro.pptx
@@ -5,10 +5,10 @@
     <p:sldMasterId id="2147483648" r:id="rId1"/>
   </p:sldMasterIdLst>
   <p:notesMasterIdLst>
-    <p:notesMasterId r:id="rId35"/>
+    <p:notesMasterId r:id="rId37"/>
   </p:notesMasterIdLst>
   <p:handoutMasterIdLst>
-    <p:handoutMasterId r:id="rId36"/>
+    <p:handoutMasterId r:id="rId38"/>
   </p:handoutMasterIdLst>
   <p:sldIdLst>
     <p:sldId id="256" r:id="rId2"/>
@@ -43,7 +43,9 @@
     <p:sldId id="343" r:id="rId31"/>
     <p:sldId id="364" r:id="rId32"/>
     <p:sldId id="373" r:id="rId33"/>
-    <p:sldId id="344" r:id="rId34"/>
+    <p:sldId id="378" r:id="rId34"/>
+    <p:sldId id="379" r:id="rId35"/>
+    <p:sldId id="344" r:id="rId36"/>
   </p:sldIdLst>
   <p:sldSz cx="12192000" cy="6858000"/>
   <p:notesSz cx="7315200" cy="9601200"/>
@@ -189,6 +191,105 @@
     </p:ext>
   </p:extLst>
 </p:presentation>
+</file>
+
+<file path=ppt/revisionInfo.xml><?xml version="1.0" encoding="utf-8"?>
+<p1510:revInfo xmlns:a="http://schemas.openxmlformats.org/drawingml/2006/main" xmlns:r="http://schemas.openxmlformats.org/officeDocument/2006/relationships" xmlns:p1510="http://schemas.microsoft.com/office/powerpoint/2015/10/main">
+  <p1510:revLst>
+    <p1510:client id="{3AB9159B-E6D6-41A3-993D-1AF5F22C6416}" v="11" dt="2021-10-25T14:50:04.390"/>
+  </p1510:revLst>
+</p1510:revInfo>
+</file>
+
+<file path=ppt/changesInfos/changesInfo1.xml><?xml version="1.0" encoding="utf-8"?>
+<pc:chgInfo xmlns:a="http://schemas.openxmlformats.org/drawingml/2006/main" xmlns:r="http://schemas.openxmlformats.org/officeDocument/2006/relationships" xmlns:ac="http://schemas.microsoft.com/office/drawing/2013/main/command" xmlns:pc="http://schemas.microsoft.com/office/powerpoint/2013/main/command">
+  <pc:docChgLst>
+    <pc:chgData name="Hewner, Mike" userId="7f3f83dd-6dfb-4127-a87f-c1714bd4fac9" providerId="ADAL" clId="{3AB9159B-E6D6-41A3-993D-1AF5F22C6416}"/>
+    <pc:docChg chg="undo custSel addSld modSld">
+      <pc:chgData name="Hewner, Mike" userId="7f3f83dd-6dfb-4127-a87f-c1714bd4fac9" providerId="ADAL" clId="{3AB9159B-E6D6-41A3-993D-1AF5F22C6416}" dt="2021-10-25T14:50:04.390" v="1028" actId="20577"/>
+      <pc:docMkLst>
+        <pc:docMk/>
+      </pc:docMkLst>
+      <pc:sldChg chg="modSp">
+        <pc:chgData name="Hewner, Mike" userId="7f3f83dd-6dfb-4127-a87f-c1714bd4fac9" providerId="ADAL" clId="{3AB9159B-E6D6-41A3-993D-1AF5F22C6416}" dt="2021-10-25T14:50:04.390" v="1028" actId="20577"/>
+        <pc:sldMkLst>
+          <pc:docMk/>
+          <pc:sldMk cId="0" sldId="344"/>
+        </pc:sldMkLst>
+        <pc:spChg chg="mod">
+          <ac:chgData name="Hewner, Mike" userId="7f3f83dd-6dfb-4127-a87f-c1714bd4fac9" providerId="ADAL" clId="{3AB9159B-E6D6-41A3-993D-1AF5F22C6416}" dt="2021-10-25T14:50:04.390" v="1028" actId="20577"/>
+          <ac:spMkLst>
+            <pc:docMk/>
+            <pc:sldMk cId="0" sldId="344"/>
+            <ac:spMk id="4" creationId="{00000000-0000-0000-0000-000000000000}"/>
+          </ac:spMkLst>
+        </pc:spChg>
+      </pc:sldChg>
+      <pc:sldChg chg="addSp modSp new mod modClrScheme chgLayout">
+        <pc:chgData name="Hewner, Mike" userId="7f3f83dd-6dfb-4127-a87f-c1714bd4fac9" providerId="ADAL" clId="{3AB9159B-E6D6-41A3-993D-1AF5F22C6416}" dt="2021-10-25T14:42:18.331" v="497" actId="20577"/>
+        <pc:sldMkLst>
+          <pc:docMk/>
+          <pc:sldMk cId="2122440510" sldId="378"/>
+        </pc:sldMkLst>
+        <pc:spChg chg="mod ord">
+          <ac:chgData name="Hewner, Mike" userId="7f3f83dd-6dfb-4127-a87f-c1714bd4fac9" providerId="ADAL" clId="{3AB9159B-E6D6-41A3-993D-1AF5F22C6416}" dt="2021-10-25T14:38:29.552" v="79" actId="700"/>
+          <ac:spMkLst>
+            <pc:docMk/>
+            <pc:sldMk cId="2122440510" sldId="378"/>
+            <ac:spMk id="2" creationId="{C87E76B1-BB47-4C0A-9D87-5C01D7FD3A34}"/>
+          </ac:spMkLst>
+        </pc:spChg>
+        <pc:spChg chg="mod ord">
+          <ac:chgData name="Hewner, Mike" userId="7f3f83dd-6dfb-4127-a87f-c1714bd4fac9" providerId="ADAL" clId="{3AB9159B-E6D6-41A3-993D-1AF5F22C6416}" dt="2021-10-25T14:41:40.531" v="363" actId="20577"/>
+          <ac:spMkLst>
+            <pc:docMk/>
+            <pc:sldMk cId="2122440510" sldId="378"/>
+            <ac:spMk id="3" creationId="{CADE99C6-4079-4D1A-95C6-A827F5C4C185}"/>
+          </ac:spMkLst>
+        </pc:spChg>
+        <pc:spChg chg="add mod ord">
+          <ac:chgData name="Hewner, Mike" userId="7f3f83dd-6dfb-4127-a87f-c1714bd4fac9" providerId="ADAL" clId="{3AB9159B-E6D6-41A3-993D-1AF5F22C6416}" dt="2021-10-25T14:42:18.331" v="497" actId="20577"/>
+          <ac:spMkLst>
+            <pc:docMk/>
+            <pc:sldMk cId="2122440510" sldId="378"/>
+            <ac:spMk id="4" creationId="{231FCD4A-B8F2-4C44-91B8-A2CF8021F8A4}"/>
+          </ac:spMkLst>
+        </pc:spChg>
+      </pc:sldChg>
+      <pc:sldChg chg="modSp new mod">
+        <pc:chgData name="Hewner, Mike" userId="7f3f83dd-6dfb-4127-a87f-c1714bd4fac9" providerId="ADAL" clId="{3AB9159B-E6D6-41A3-993D-1AF5F22C6416}" dt="2021-10-25T14:49:29.511" v="1017" actId="313"/>
+        <pc:sldMkLst>
+          <pc:docMk/>
+          <pc:sldMk cId="3362507692" sldId="379"/>
+        </pc:sldMkLst>
+        <pc:spChg chg="mod">
+          <ac:chgData name="Hewner, Mike" userId="7f3f83dd-6dfb-4127-a87f-c1714bd4fac9" providerId="ADAL" clId="{3AB9159B-E6D6-41A3-993D-1AF5F22C6416}" dt="2021-10-25T14:43:00.241" v="527" actId="20577"/>
+          <ac:spMkLst>
+            <pc:docMk/>
+            <pc:sldMk cId="3362507692" sldId="379"/>
+            <ac:spMk id="2" creationId="{5A20DDC7-6EC3-440E-AC6F-10D4F5C0B567}"/>
+          </ac:spMkLst>
+        </pc:spChg>
+        <pc:spChg chg="mod">
+          <ac:chgData name="Hewner, Mike" userId="7f3f83dd-6dfb-4127-a87f-c1714bd4fac9" providerId="ADAL" clId="{3AB9159B-E6D6-41A3-993D-1AF5F22C6416}" dt="2021-10-25T14:48:42.051" v="1007" actId="20577"/>
+          <ac:spMkLst>
+            <pc:docMk/>
+            <pc:sldMk cId="3362507692" sldId="379"/>
+            <ac:spMk id="3" creationId="{7422E1F2-2411-4B53-9511-60EBA9BBBEA0}"/>
+          </ac:spMkLst>
+        </pc:spChg>
+        <pc:spChg chg="mod">
+          <ac:chgData name="Hewner, Mike" userId="7f3f83dd-6dfb-4127-a87f-c1714bd4fac9" providerId="ADAL" clId="{3AB9159B-E6D6-41A3-993D-1AF5F22C6416}" dt="2021-10-25T14:49:29.511" v="1017" actId="313"/>
+          <ac:spMkLst>
+            <pc:docMk/>
+            <pc:sldMk cId="3362507692" sldId="379"/>
+            <ac:spMk id="4" creationId="{C32808F3-637E-4599-B01E-59320E918FB7}"/>
+          </ac:spMkLst>
+        </pc:spChg>
+      </pc:sldChg>
+    </pc:docChg>
+  </pc:docChgLst>
+</pc:chgInfo>
 </file>
 
 <file path=ppt/handoutMasters/handoutMaster1.xml><?xml version="1.0" encoding="utf-8"?>
@@ -14377,6 +14478,397 @@
 </file>
 
 <file path=ppt/slides/slide33.xml><?xml version="1.0" encoding="utf-8"?>
+<p:sld xmlns:a="http://schemas.openxmlformats.org/drawingml/2006/main" xmlns:r="http://schemas.openxmlformats.org/officeDocument/2006/relationships" xmlns:p="http://schemas.openxmlformats.org/presentationml/2006/main">
+  <p:cSld>
+    <p:spTree>
+      <p:nvGrpSpPr>
+        <p:cNvPr id="1" name=""/>
+        <p:cNvGrpSpPr/>
+        <p:nvPr/>
+      </p:nvGrpSpPr>
+      <p:grpSpPr>
+        <a:xfrm>
+          <a:off x="0" y="0"/>
+          <a:ext cx="0" cy="0"/>
+          <a:chOff x="0" y="0"/>
+          <a:chExt cx="0" cy="0"/>
+        </a:xfrm>
+      </p:grpSpPr>
+      <p:sp>
+        <p:nvSpPr>
+          <p:cNvPr id="2" name="Title 1">
+            <a:extLst>
+              <a:ext uri="{FF2B5EF4-FFF2-40B4-BE49-F238E27FC236}">
+                <a16:creationId xmlns:a16="http://schemas.microsoft.com/office/drawing/2014/main" id="{C87E76B1-BB47-4C0A-9D87-5C01D7FD3A34}"/>
+              </a:ext>
+            </a:extLst>
+          </p:cNvPr>
+          <p:cNvSpPr>
+            <a:spLocks noGrp="1"/>
+          </p:cNvSpPr>
+          <p:nvPr>
+            <p:ph type="title"/>
+          </p:nvPr>
+        </p:nvSpPr>
+        <p:spPr/>
+        <p:txBody>
+          <a:bodyPr/>
+          <a:lstStyle/>
+          <a:p>
+            <a:r>
+              <a:rPr lang="en-US" dirty="0"/>
+              <a:t>Error Handling with Continuations</a:t>
+            </a:r>
+          </a:p>
+        </p:txBody>
+      </p:sp>
+      <p:sp>
+        <p:nvSpPr>
+          <p:cNvPr id="3" name="Content Placeholder 2">
+            <a:extLst>
+              <a:ext uri="{FF2B5EF4-FFF2-40B4-BE49-F238E27FC236}">
+                <a16:creationId xmlns:a16="http://schemas.microsoft.com/office/drawing/2014/main" id="{CADE99C6-4079-4D1A-95C6-A827F5C4C185}"/>
+              </a:ext>
+            </a:extLst>
+          </p:cNvPr>
+          <p:cNvSpPr>
+            <a:spLocks noGrp="1"/>
+          </p:cNvSpPr>
+          <p:nvPr>
+            <p:ph sz="half" idx="1"/>
+          </p:nvPr>
+        </p:nvSpPr>
+        <p:spPr/>
+        <p:txBody>
+          <a:bodyPr/>
+          <a:lstStyle/>
+          <a:p>
+            <a:pPr marL="0" indent="0">
+              <a:buNone/>
+            </a:pPr>
+            <a:r>
+              <a:rPr lang="en-US" dirty="0"/>
+              <a:t>try {</a:t>
+            </a:r>
+          </a:p>
+          <a:p>
+            <a:pPr marL="0" indent="0">
+              <a:buNone/>
+            </a:pPr>
+            <a:r>
+              <a:rPr lang="en-US" dirty="0"/>
+              <a:t>   potentially erroring code</a:t>
+            </a:r>
+          </a:p>
+          <a:p>
+            <a:pPr marL="0" indent="0">
+              <a:buNone/>
+            </a:pPr>
+            <a:r>
+              <a:rPr lang="en-US" dirty="0"/>
+              <a:t>   ordinary code that relies on success</a:t>
+            </a:r>
+          </a:p>
+          <a:p>
+            <a:pPr marL="0" indent="0">
+              <a:buNone/>
+            </a:pPr>
+            <a:r>
+              <a:rPr lang="en-US" dirty="0"/>
+              <a:t>} catch (</a:t>
+            </a:r>
+            <a:r>
+              <a:rPr lang="en-US" dirty="0" err="1"/>
+              <a:t>errorflavor</a:t>
+            </a:r>
+            <a:r>
+              <a:rPr lang="en-US" dirty="0"/>
+              <a:t>) {</a:t>
+            </a:r>
+          </a:p>
+          <a:p>
+            <a:pPr marL="0" indent="0">
+              <a:buNone/>
+            </a:pPr>
+            <a:r>
+              <a:rPr lang="en-US" dirty="0"/>
+              <a:t>  error handling code</a:t>
+            </a:r>
+          </a:p>
+          <a:p>
+            <a:pPr marL="0" indent="0">
+              <a:buNone/>
+            </a:pPr>
+            <a:r>
+              <a:rPr lang="en-US" dirty="0"/>
+              <a:t>}</a:t>
+            </a:r>
+          </a:p>
+        </p:txBody>
+      </p:sp>
+      <p:sp>
+        <p:nvSpPr>
+          <p:cNvPr id="4" name="Content Placeholder 3">
+            <a:extLst>
+              <a:ext uri="{FF2B5EF4-FFF2-40B4-BE49-F238E27FC236}">
+                <a16:creationId xmlns:a16="http://schemas.microsoft.com/office/drawing/2014/main" id="{231FCD4A-B8F2-4C44-91B8-A2CF8021F8A4}"/>
+              </a:ext>
+            </a:extLst>
+          </p:cNvPr>
+          <p:cNvSpPr>
+            <a:spLocks noGrp="1"/>
+          </p:cNvSpPr>
+          <p:nvPr>
+            <p:ph sz="half" idx="2"/>
+          </p:nvPr>
+        </p:nvSpPr>
+        <p:spPr/>
+        <p:txBody>
+          <a:bodyPr/>
+          <a:lstStyle/>
+          <a:p>
+            <a:pPr marL="0" indent="0">
+              <a:buNone/>
+            </a:pPr>
+            <a:r>
+              <a:rPr lang="en-US" dirty="0"/>
+              <a:t>// try causes a call-cc, with a continuation that will bring us directly to the catch</a:t>
+            </a:r>
+          </a:p>
+          <a:p>
+            <a:pPr marL="0" indent="0">
+              <a:buNone/>
+            </a:pPr>
+            <a:r>
+              <a:rPr lang="en-US" dirty="0"/>
+              <a:t>//post try code looks at the result to determine if an error happened, if so it invokes the catch, otherwise it returns the value</a:t>
+            </a:r>
+          </a:p>
+          <a:p>
+            <a:pPr marL="0" indent="0">
+              <a:buNone/>
+            </a:pPr>
+            <a:endParaRPr lang="en-US" dirty="0"/>
+          </a:p>
+        </p:txBody>
+      </p:sp>
+    </p:spTree>
+    <p:extLst>
+      <p:ext uri="{BB962C8B-B14F-4D97-AF65-F5344CB8AC3E}">
+        <p14:creationId xmlns:p14="http://schemas.microsoft.com/office/powerpoint/2010/main" val="2122440510"/>
+      </p:ext>
+    </p:extLst>
+  </p:cSld>
+  <p:clrMapOvr>
+    <a:masterClrMapping/>
+  </p:clrMapOvr>
+</p:sld>
+</file>
+
+<file path=ppt/slides/slide34.xml><?xml version="1.0" encoding="utf-8"?>
+<p:sld xmlns:a="http://schemas.openxmlformats.org/drawingml/2006/main" xmlns:r="http://schemas.openxmlformats.org/officeDocument/2006/relationships" xmlns:p="http://schemas.openxmlformats.org/presentationml/2006/main">
+  <p:cSld>
+    <p:spTree>
+      <p:nvGrpSpPr>
+        <p:cNvPr id="1" name=""/>
+        <p:cNvGrpSpPr/>
+        <p:nvPr/>
+      </p:nvGrpSpPr>
+      <p:grpSpPr>
+        <a:xfrm>
+          <a:off x="0" y="0"/>
+          <a:ext cx="0" cy="0"/>
+          <a:chOff x="0" y="0"/>
+          <a:chExt cx="0" cy="0"/>
+        </a:xfrm>
+      </p:grpSpPr>
+      <p:sp>
+        <p:nvSpPr>
+          <p:cNvPr id="2" name="Title 1">
+            <a:extLst>
+              <a:ext uri="{FF2B5EF4-FFF2-40B4-BE49-F238E27FC236}">
+                <a16:creationId xmlns:a16="http://schemas.microsoft.com/office/drawing/2014/main" id="{5A20DDC7-6EC3-440E-AC6F-10D4F5C0B567}"/>
+              </a:ext>
+            </a:extLst>
+          </p:cNvPr>
+          <p:cNvSpPr>
+            <a:spLocks noGrp="1"/>
+          </p:cNvSpPr>
+          <p:nvPr>
+            <p:ph type="title"/>
+          </p:nvPr>
+        </p:nvSpPr>
+        <p:spPr/>
+        <p:txBody>
+          <a:bodyPr/>
+          <a:lstStyle/>
+          <a:p>
+            <a:r>
+              <a:rPr lang="en-US" dirty="0"/>
+              <a:t>Continuations with user input</a:t>
+            </a:r>
+          </a:p>
+        </p:txBody>
+      </p:sp>
+      <p:sp>
+        <p:nvSpPr>
+          <p:cNvPr id="3" name="Content Placeholder 2">
+            <a:extLst>
+              <a:ext uri="{FF2B5EF4-FFF2-40B4-BE49-F238E27FC236}">
+                <a16:creationId xmlns:a16="http://schemas.microsoft.com/office/drawing/2014/main" id="{7422E1F2-2411-4B53-9511-60EBA9BBBEA0}"/>
+              </a:ext>
+            </a:extLst>
+          </p:cNvPr>
+          <p:cNvSpPr>
+            <a:spLocks noGrp="1"/>
+          </p:cNvSpPr>
+          <p:nvPr>
+            <p:ph sz="half" idx="1"/>
+          </p:nvPr>
+        </p:nvSpPr>
+        <p:spPr/>
+        <p:txBody>
+          <a:bodyPr/>
+          <a:lstStyle/>
+          <a:p>
+            <a:pPr marL="0" indent="0">
+              <a:buNone/>
+            </a:pPr>
+            <a:r>
+              <a:rPr lang="en-US" dirty="0"/>
+              <a:t>We often want functions that look like this</a:t>
+            </a:r>
+          </a:p>
+          <a:p>
+            <a:pPr marL="0" indent="0">
+              <a:buNone/>
+            </a:pPr>
+            <a:r>
+              <a:rPr lang="en-US" dirty="0"/>
+              <a:t>(define (calc-complex-thing x y)</a:t>
+            </a:r>
+          </a:p>
+          <a:p>
+            <a:pPr marL="0" indent="0">
+              <a:buNone/>
+            </a:pPr>
+            <a:r>
+              <a:rPr lang="en-US" dirty="0"/>
+              <a:t>(let ((user-</a:t>
+            </a:r>
+            <a:r>
+              <a:rPr lang="en-US" dirty="0" err="1"/>
+              <a:t>val</a:t>
+            </a:r>
+            <a:r>
+              <a:rPr lang="en-US" dirty="0"/>
+              <a:t> (ask-user-question))</a:t>
+            </a:r>
+          </a:p>
+          <a:p>
+            <a:pPr marL="0" indent="0">
+              <a:buNone/>
+            </a:pPr>
+            <a:r>
+              <a:rPr lang="en-US" dirty="0"/>
+              <a:t>   (do-</a:t>
+            </a:r>
+            <a:r>
+              <a:rPr lang="en-US" dirty="0" err="1"/>
+              <a:t>calculculation</a:t>
+            </a:r>
+            <a:r>
+              <a:rPr lang="en-US" dirty="0"/>
+              <a:t> x y user-value)))</a:t>
+            </a:r>
+          </a:p>
+        </p:txBody>
+      </p:sp>
+      <p:sp>
+        <p:nvSpPr>
+          <p:cNvPr id="4" name="Content Placeholder 3">
+            <a:extLst>
+              <a:ext uri="{FF2B5EF4-FFF2-40B4-BE49-F238E27FC236}">
+                <a16:creationId xmlns:a16="http://schemas.microsoft.com/office/drawing/2014/main" id="{C32808F3-637E-4599-B01E-59320E918FB7}"/>
+              </a:ext>
+            </a:extLst>
+          </p:cNvPr>
+          <p:cNvSpPr>
+            <a:spLocks noGrp="1"/>
+          </p:cNvSpPr>
+          <p:nvPr>
+            <p:ph sz="half" idx="2"/>
+          </p:nvPr>
+        </p:nvSpPr>
+        <p:spPr/>
+        <p:txBody>
+          <a:bodyPr/>
+          <a:lstStyle/>
+          <a:p>
+            <a:pPr marL="0" indent="0">
+              <a:buNone/>
+            </a:pPr>
+            <a:r>
+              <a:rPr lang="en-US" dirty="0"/>
+              <a:t>But the reality is that interacting with the user actually forces us out of our functions.  So we need ugly callback.</a:t>
+            </a:r>
+          </a:p>
+          <a:p>
+            <a:pPr marL="0" indent="0">
+              <a:buNone/>
+            </a:pPr>
+            <a:endParaRPr lang="en-US" dirty="0"/>
+          </a:p>
+          <a:p>
+            <a:pPr marL="0" indent="0">
+              <a:buNone/>
+            </a:pPr>
+            <a:r>
+              <a:rPr lang="en-US" dirty="0"/>
+              <a:t>(open-dialog “user question” (lambda (user-</a:t>
+            </a:r>
+            <a:r>
+              <a:rPr lang="en-US" dirty="0" err="1"/>
+              <a:t>val</a:t>
+            </a:r>
+            <a:r>
+              <a:rPr lang="en-US" dirty="0"/>
+              <a:t>) (do-calculation x y user-</a:t>
+            </a:r>
+            <a:r>
+              <a:rPr lang="en-US" dirty="0" err="1"/>
+              <a:t>val</a:t>
+            </a:r>
+            <a:r>
+              <a:rPr lang="en-US" dirty="0"/>
+              <a:t>)))</a:t>
+            </a:r>
+          </a:p>
+          <a:p>
+            <a:pPr marL="0" indent="0">
+              <a:buNone/>
+            </a:pPr>
+            <a:r>
+              <a:rPr lang="en-US" dirty="0"/>
+              <a:t>;; see how this function weirdly returns  </a:t>
+            </a:r>
+          </a:p>
+        </p:txBody>
+      </p:sp>
+    </p:spTree>
+    <p:extLst>
+      <p:ext uri="{BB962C8B-B14F-4D97-AF65-F5344CB8AC3E}">
+        <p14:creationId xmlns:p14="http://schemas.microsoft.com/office/powerpoint/2010/main" val="3362507692"/>
+      </p:ext>
+    </p:extLst>
+  </p:cSld>
+  <p:clrMapOvr>
+    <a:masterClrMapping/>
+  </p:clrMapOvr>
+</p:sld>
+</file>
+
+<file path=ppt/slides/slide35.xml><?xml version="1.0" encoding="utf-8"?>
 <p:sld xmlns:a="http://schemas.openxmlformats.org/drawingml/2006/main" xmlns:r="http://schemas.openxmlformats.org/officeDocument/2006/relationships" xmlns:p="http://schemas.openxmlformats.org/presentationml/2006/main" showMasterPhAnim="0">
   <p:cSld>
     <p:spTree>
@@ -14636,7 +15128,7 @@
         <p:spPr>
           <a:xfrm>
             <a:off x="6132577" y="2438400"/>
-            <a:ext cx="3196525" cy="1384995"/>
+            <a:ext cx="3196525" cy="2246769"/>
           </a:xfrm>
           <a:prstGeom prst="rect">
             <a:avLst/>
@@ -14661,6 +15153,23 @@
                 </a:solidFill>
               </a:rPr>
               <a:t>We may not do this one in class; good practice for you.</a:t>
+            </a:r>
+          </a:p>
+          <a:p>
+            <a:endParaRPr lang="en-US" sz="2800" dirty="0">
+              <a:solidFill>
+                <a:srgbClr val="66FF66"/>
+              </a:solidFill>
+            </a:endParaRPr>
+          </a:p>
+          <a:p>
+            <a:r>
+              <a:rPr lang="en-US" sz="2800" dirty="0">
+                <a:solidFill>
+                  <a:srgbClr val="66FF66"/>
+                </a:solidFill>
+              </a:rPr>
+              <a:t>1 1 2 1 3</a:t>
             </a:r>
           </a:p>
         </p:txBody>

</xml_diff>

<commit_message>
more activity oriented final day
</commit_message>
<xml_diff>
--- a/ClassMaterials/CallCC1/27-29-callcc-intro.pptx
+++ b/ClassMaterials/CallCC1/27-29-callcc-intro.pptx
@@ -15619,12 +15619,9 @@
           <a:p>
             <a:r>
               <a:rPr lang="en-US" sz="4000" b="1" dirty="0"/>
-              <a:t>Review of Continuations</a:t>
-            </a:r>
-            <a:r>
-              <a:rPr lang="en-US" sz="4000" dirty="0"/>
-              <a:t> </a:t>
-            </a:r>
+              <a:t>The Continuation Game</a:t>
+            </a:r>
+            <a:endParaRPr lang="en-US" sz="4000" dirty="0"/>
           </a:p>
         </p:txBody>
       </p:sp>

</xml_diff>